<commit_message>
feat: Storyboard Draft 1
</commit_message>
<xml_diff>
--- a/project/documents/m2-UserInterfaces/Storyboard - Smart Support.pptx
+++ b/project/documents/m2-UserInterfaces/Storyboard - Smart Support.pptx
@@ -11,6 +11,10 @@
     <p:sldId id="259" r:id="rId5"/>
     <p:sldId id="261" r:id="rId6"/>
     <p:sldId id="260" r:id="rId7"/>
+    <p:sldId id="262" r:id="rId8"/>
+    <p:sldId id="263" r:id="rId9"/>
+    <p:sldId id="264" r:id="rId10"/>
+    <p:sldId id="267" r:id="rId11"/>
   </p:sldIdLst>
   <p:sldSz cx="12192000" cy="6858000"/>
   <p:notesSz cx="6858000" cy="9144000"/>
@@ -110,6 +114,18 @@
     </a:lvl9pPr>
   </p:defaultTextStyle>
 </p:presentation>
+</file>
+
+<file path=ppt/commentAuthors.xml><?xml version="1.0" encoding="utf-8"?>
+<p:cmAuthorLst xmlns:a="http://schemas.openxmlformats.org/drawingml/2006/main" xmlns:r="http://schemas.openxmlformats.org/officeDocument/2006/relationships" xmlns:p="http://schemas.openxmlformats.org/presentationml/2006/main">
+  <p:cmAuthor id="1" name="navin" initials="n" lastIdx="2" clrIdx="0">
+    <p:extLst>
+      <p:ext uri="{19B8F6BF-5375-455C-9EA6-DF929625EA0E}">
+        <p15:presenceInfo xmlns:p15="http://schemas.microsoft.com/office/powerpoint/2012/main" userId="navin" providerId="None"/>
+      </p:ext>
+    </p:extLst>
+  </p:cmAuthor>
+</p:cmAuthorLst>
 </file>
 
 <file path=ppt/slideLayouts/slideLayout1.xml><?xml version="1.0" encoding="utf-8"?>
@@ -3444,6 +3460,328 @@
 </p:sld>
 </file>
 
+<file path=ppt/slides/slide10.xml><?xml version="1.0" encoding="utf-8"?>
+<p:sld xmlns:a="http://schemas.openxmlformats.org/drawingml/2006/main" xmlns:r="http://schemas.openxmlformats.org/officeDocument/2006/relationships" xmlns:p="http://schemas.openxmlformats.org/presentationml/2006/main">
+  <p:cSld>
+    <p:spTree>
+      <p:nvGrpSpPr>
+        <p:cNvPr id="1" name=""/>
+        <p:cNvGrpSpPr/>
+        <p:nvPr/>
+      </p:nvGrpSpPr>
+      <p:grpSpPr>
+        <a:xfrm>
+          <a:off x="0" y="0"/>
+          <a:ext cx="0" cy="0"/>
+          <a:chOff x="0" y="0"/>
+          <a:chExt cx="0" cy="0"/>
+        </a:xfrm>
+      </p:grpSpPr>
+      <p:sp>
+        <p:nvSpPr>
+          <p:cNvPr id="3" name="Content Placeholder 2">
+            <a:extLst>
+              <a:ext uri="{FF2B5EF4-FFF2-40B4-BE49-F238E27FC236}">
+                <a16:creationId xmlns:a16="http://schemas.microsoft.com/office/drawing/2014/main" id="{54E999D1-9C0D-4627-9242-9E30AC7C661F}"/>
+              </a:ext>
+            </a:extLst>
+          </p:cNvPr>
+          <p:cNvSpPr>
+            <a:spLocks noGrp="1"/>
+          </p:cNvSpPr>
+          <p:nvPr>
+            <p:ph idx="1"/>
+          </p:nvPr>
+        </p:nvSpPr>
+        <p:spPr>
+          <a:xfrm>
+            <a:off x="8290791" y="1312742"/>
+            <a:ext cx="3063009" cy="5409652"/>
+          </a:xfrm>
+        </p:spPr>
+        <p:txBody>
+          <a:bodyPr>
+            <a:normAutofit/>
+          </a:bodyPr>
+          <a:lstStyle/>
+          <a:p>
+            <a:r>
+              <a:rPr lang="en-US" sz="2000" i="1" dirty="0">
+                <a:solidFill>
+                  <a:schemeClr val="bg1">
+                    <a:lumMod val="50000"/>
+                  </a:schemeClr>
+                </a:solidFill>
+              </a:rPr>
+              <a:t>Admins</a:t>
+            </a:r>
+            <a:r>
+              <a:rPr lang="en-US" sz="2000" dirty="0">
+                <a:solidFill>
+                  <a:schemeClr val="bg1">
+                    <a:lumMod val="50000"/>
+                  </a:schemeClr>
+                </a:solidFill>
+              </a:rPr>
+              <a:t> can see the list of all </a:t>
+            </a:r>
+            <a:r>
+              <a:rPr lang="en-US" sz="2000" b="1" dirty="0">
+                <a:solidFill>
+                  <a:schemeClr val="bg1">
+                    <a:lumMod val="50000"/>
+                  </a:schemeClr>
+                </a:solidFill>
+              </a:rPr>
+              <a:t>Open</a:t>
+            </a:r>
+            <a:r>
+              <a:rPr lang="en-US" sz="2000" dirty="0">
+                <a:solidFill>
+                  <a:schemeClr val="bg1">
+                    <a:lumMod val="50000"/>
+                  </a:schemeClr>
+                </a:solidFill>
+              </a:rPr>
+              <a:t> and </a:t>
+            </a:r>
+            <a:r>
+              <a:rPr lang="en-US" sz="2000" b="1" dirty="0">
+                <a:solidFill>
+                  <a:schemeClr val="bg1">
+                    <a:lumMod val="50000"/>
+                  </a:schemeClr>
+                </a:solidFill>
+              </a:rPr>
+              <a:t>Resolved</a:t>
+            </a:r>
+            <a:r>
+              <a:rPr lang="en-US" sz="2000" dirty="0">
+                <a:solidFill>
+                  <a:schemeClr val="bg1">
+                    <a:lumMod val="50000"/>
+                  </a:schemeClr>
+                </a:solidFill>
+              </a:rPr>
+              <a:t> tickets on their dashboard sorted by </a:t>
+            </a:r>
+            <a:r>
+              <a:rPr lang="en-US" sz="2000" i="1" dirty="0">
+                <a:solidFill>
+                  <a:schemeClr val="bg1">
+                    <a:lumMod val="50000"/>
+                  </a:schemeClr>
+                </a:solidFill>
+              </a:rPr>
+              <a:t>upvotes</a:t>
+            </a:r>
+            <a:r>
+              <a:rPr lang="en-US" sz="2000" dirty="0">
+                <a:solidFill>
+                  <a:schemeClr val="bg1">
+                    <a:lumMod val="50000"/>
+                  </a:schemeClr>
+                </a:solidFill>
+              </a:rPr>
+              <a:t> and </a:t>
+            </a:r>
+            <a:r>
+              <a:rPr lang="en-US" sz="2000" i="1" dirty="0">
+                <a:solidFill>
+                  <a:schemeClr val="bg1">
+                    <a:lumMod val="50000"/>
+                  </a:schemeClr>
+                </a:solidFill>
+              </a:rPr>
+              <a:t>date.</a:t>
+            </a:r>
+          </a:p>
+          <a:p>
+            <a:r>
+              <a:rPr lang="en-US" sz="2000" dirty="0">
+                <a:solidFill>
+                  <a:schemeClr val="bg1">
+                    <a:lumMod val="50000"/>
+                  </a:schemeClr>
+                </a:solidFill>
+              </a:rPr>
+              <a:t>They can </a:t>
+            </a:r>
+            <a:r>
+              <a:rPr lang="en-US" sz="2000" i="1" dirty="0">
+                <a:solidFill>
+                  <a:schemeClr val="bg1">
+                    <a:lumMod val="50000"/>
+                  </a:schemeClr>
+                </a:solidFill>
+              </a:rPr>
+              <a:t>assign</a:t>
+            </a:r>
+            <a:r>
+              <a:rPr lang="en-US" sz="2000" dirty="0">
+                <a:solidFill>
+                  <a:schemeClr val="bg1">
+                    <a:lumMod val="50000"/>
+                  </a:schemeClr>
+                </a:solidFill>
+              </a:rPr>
+              <a:t> the tickets to specific support users or they can </a:t>
+            </a:r>
+            <a:r>
+              <a:rPr lang="en-US" sz="2000" i="1" dirty="0">
+                <a:solidFill>
+                  <a:schemeClr val="bg1">
+                    <a:lumMod val="50000"/>
+                  </a:schemeClr>
+                </a:solidFill>
+              </a:rPr>
+              <a:t>respond</a:t>
+            </a:r>
+            <a:r>
+              <a:rPr lang="en-US" sz="2000" dirty="0">
+                <a:solidFill>
+                  <a:schemeClr val="bg1">
+                    <a:lumMod val="50000"/>
+                  </a:schemeClr>
+                </a:solidFill>
+              </a:rPr>
+              <a:t> to the tickets themselves.</a:t>
+            </a:r>
+          </a:p>
+          <a:p>
+            <a:r>
+              <a:rPr lang="en-US" sz="2000" dirty="0">
+                <a:solidFill>
+                  <a:schemeClr val="bg1">
+                    <a:lumMod val="50000"/>
+                  </a:schemeClr>
+                </a:solidFill>
+              </a:rPr>
+              <a:t>They can also add any of the resolved tickets to FAQs list.</a:t>
+            </a:r>
+          </a:p>
+        </p:txBody>
+      </p:sp>
+      <p:sp>
+        <p:nvSpPr>
+          <p:cNvPr id="6" name="TextBox 5">
+            <a:extLst>
+              <a:ext uri="{FF2B5EF4-FFF2-40B4-BE49-F238E27FC236}">
+                <a16:creationId xmlns:a16="http://schemas.microsoft.com/office/drawing/2014/main" id="{673C403C-1145-4294-A9CE-9D4464427895}"/>
+              </a:ext>
+            </a:extLst>
+          </p:cNvPr>
+          <p:cNvSpPr txBox="1"/>
+          <p:nvPr/>
+        </p:nvSpPr>
+        <p:spPr>
+          <a:xfrm>
+            <a:off x="704963" y="843055"/>
+            <a:ext cx="2625764" cy="469687"/>
+          </a:xfrm>
+          <a:prstGeom prst="rect">
+            <a:avLst/>
+          </a:prstGeom>
+          <a:noFill/>
+        </p:spPr>
+        <p:txBody>
+          <a:bodyPr wrap="square" rtlCol="0">
+            <a:spAutoFit/>
+          </a:bodyPr>
+          <a:lstStyle/>
+          <a:p>
+            <a:r>
+              <a:rPr lang="en-IN" sz="2400" b="1" dirty="0"/>
+              <a:t>Admin Dashboard</a:t>
+            </a:r>
+          </a:p>
+        </p:txBody>
+      </p:sp>
+      <p:pic>
+        <p:nvPicPr>
+          <p:cNvPr id="7" name="Picture 6">
+            <a:extLst>
+              <a:ext uri="{FF2B5EF4-FFF2-40B4-BE49-F238E27FC236}">
+                <a16:creationId xmlns:a16="http://schemas.microsoft.com/office/drawing/2014/main" id="{09AF17F0-7F32-4095-8195-DDD63EE3D076}"/>
+              </a:ext>
+            </a:extLst>
+          </p:cNvPr>
+          <p:cNvPicPr>
+            <a:picLocks noChangeAspect="1"/>
+          </p:cNvPicPr>
+          <p:nvPr/>
+        </p:nvPicPr>
+        <p:blipFill>
+          <a:blip r:embed="rId2">
+            <a:extLst>
+              <a:ext uri="{28A0092B-C50C-407E-A947-70E740481C1C}">
+                <a14:useLocalDpi xmlns:a14="http://schemas.microsoft.com/office/drawing/2010/main" val="0"/>
+              </a:ext>
+            </a:extLst>
+          </a:blip>
+          <a:stretch>
+            <a:fillRect/>
+          </a:stretch>
+        </p:blipFill>
+        <p:spPr>
+          <a:xfrm>
+            <a:off x="742139" y="1312742"/>
+            <a:ext cx="7548652" cy="4358143"/>
+          </a:xfrm>
+          <a:prstGeom prst="rect">
+            <a:avLst/>
+          </a:prstGeom>
+        </p:spPr>
+      </p:pic>
+      <p:pic>
+        <p:nvPicPr>
+          <p:cNvPr id="4" name="Picture 3">
+            <a:extLst>
+              <a:ext uri="{FF2B5EF4-FFF2-40B4-BE49-F238E27FC236}">
+                <a16:creationId xmlns:a16="http://schemas.microsoft.com/office/drawing/2014/main" id="{13F793C3-A5E2-421D-A928-7E656851752D}"/>
+              </a:ext>
+            </a:extLst>
+          </p:cNvPr>
+          <p:cNvPicPr>
+            <a:picLocks noChangeAspect="1"/>
+          </p:cNvPicPr>
+          <p:nvPr/>
+        </p:nvPicPr>
+        <p:blipFill>
+          <a:blip r:embed="rId3">
+            <a:extLst>
+              <a:ext uri="{28A0092B-C50C-407E-A947-70E740481C1C}">
+                <a14:useLocalDpi xmlns:a14="http://schemas.microsoft.com/office/drawing/2010/main" val="0"/>
+              </a:ext>
+            </a:extLst>
+          </a:blip>
+          <a:stretch>
+            <a:fillRect/>
+          </a:stretch>
+        </p:blipFill>
+        <p:spPr>
+          <a:xfrm>
+            <a:off x="742140" y="1312742"/>
+            <a:ext cx="7533274" cy="4358143"/>
+          </a:xfrm>
+          <a:prstGeom prst="rect">
+            <a:avLst/>
+          </a:prstGeom>
+        </p:spPr>
+      </p:pic>
+    </p:spTree>
+    <p:extLst>
+      <p:ext uri="{BB962C8B-B14F-4D97-AF65-F5344CB8AC3E}">
+        <p14:creationId xmlns:p14="http://schemas.microsoft.com/office/powerpoint/2010/main" val="1765799337"/>
+      </p:ext>
+    </p:extLst>
+  </p:cSld>
+  <p:clrMapOvr>
+    <a:masterClrMapping/>
+  </p:clrMapOvr>
+</p:sld>
+</file>
+
 <file path=ppt/slides/slide2.xml><?xml version="1.0" encoding="utf-8"?>
 <p:sld xmlns:a="http://schemas.openxmlformats.org/drawingml/2006/main" xmlns:r="http://schemas.openxmlformats.org/officeDocument/2006/relationships" xmlns:p="http://schemas.openxmlformats.org/presentationml/2006/main">
   <p:cSld>
@@ -3569,8 +3907,8 @@
         </p:nvSpPr>
         <p:spPr>
           <a:xfrm>
-            <a:off x="1524000" y="4420186"/>
-            <a:ext cx="9144000" cy="1655762"/>
+            <a:off x="1524000" y="4548522"/>
+            <a:ext cx="9144000" cy="1106319"/>
           </a:xfrm>
         </p:spPr>
         <p:txBody>
@@ -3651,7 +3989,7 @@
         </p:blipFill>
         <p:spPr>
           <a:xfrm>
-            <a:off x="289105" y="906379"/>
+            <a:off x="289105" y="1034715"/>
             <a:ext cx="5701284" cy="3276600"/>
           </a:xfrm>
           <a:prstGeom prst="rect">
@@ -3687,7 +4025,7 @@
         </p:blipFill>
         <p:spPr>
           <a:xfrm>
-            <a:off x="6223456" y="906379"/>
+            <a:off x="6223456" y="1034715"/>
             <a:ext cx="5679439" cy="3276600"/>
           </a:xfrm>
           <a:prstGeom prst="rect">
@@ -3743,7 +4081,7 @@
         </p:nvSpPr>
         <p:spPr>
           <a:xfrm>
-            <a:off x="1018674" y="4844716"/>
+            <a:off x="1018674" y="5005136"/>
             <a:ext cx="10335126" cy="1332247"/>
           </a:xfrm>
         </p:spPr>
@@ -3804,8 +4142,44 @@
         </p:blipFill>
         <p:spPr>
           <a:xfrm>
-            <a:off x="2429933" y="489285"/>
+            <a:off x="2429933" y="649705"/>
             <a:ext cx="7332133" cy="4212392"/>
+          </a:xfrm>
+          <a:prstGeom prst="rect">
+            <a:avLst/>
+          </a:prstGeom>
+        </p:spPr>
+      </p:pic>
+      <p:pic>
+        <p:nvPicPr>
+          <p:cNvPr id="9" name="Picture 8">
+            <a:extLst>
+              <a:ext uri="{FF2B5EF4-FFF2-40B4-BE49-F238E27FC236}">
+                <a16:creationId xmlns:a16="http://schemas.microsoft.com/office/drawing/2014/main" id="{ADAE1BA2-56D2-446E-A665-9C003F010362}"/>
+              </a:ext>
+            </a:extLst>
+          </p:cNvPr>
+          <p:cNvPicPr>
+            <a:picLocks noChangeAspect="1"/>
+          </p:cNvPicPr>
+          <p:nvPr/>
+        </p:nvPicPr>
+        <p:blipFill>
+          <a:blip r:embed="rId3">
+            <a:extLst>
+              <a:ext uri="{28A0092B-C50C-407E-A947-70E740481C1C}">
+                <a14:useLocalDpi xmlns:a14="http://schemas.microsoft.com/office/drawing/2010/main" val="0"/>
+              </a:ext>
+            </a:extLst>
+          </a:blip>
+          <a:stretch>
+            <a:fillRect/>
+          </a:stretch>
+        </p:blipFill>
+        <p:spPr>
+          <a:xfrm>
+            <a:off x="2476149" y="528638"/>
+            <a:ext cx="7420175" cy="4305385"/>
           </a:xfrm>
           <a:prstGeom prst="rect">
             <a:avLst/>
@@ -3954,7 +4328,27 @@
                   </a:schemeClr>
                 </a:solidFill>
               </a:rPr>
-              <a:t>She can also upvote an existing ticket.</a:t>
+              <a:t>She can also </a:t>
+            </a:r>
+            <a:r>
+              <a:rPr lang="en-US" sz="1800" b="1" dirty="0">
+                <a:solidFill>
+                  <a:schemeClr val="bg1">
+                    <a:lumMod val="50000"/>
+                  </a:schemeClr>
+                </a:solidFill>
+              </a:rPr>
+              <a:t>upvote</a:t>
+            </a:r>
+            <a:r>
+              <a:rPr lang="en-US" sz="1800" dirty="0">
+                <a:solidFill>
+                  <a:schemeClr val="bg1">
+                    <a:lumMod val="50000"/>
+                  </a:schemeClr>
+                </a:solidFill>
+              </a:rPr>
+              <a:t> an existing ticket.</a:t>
             </a:r>
             <a:endParaRPr lang="en-IN" sz="1800" dirty="0">
               <a:solidFill>
@@ -3996,6 +4390,42 @@
           <a:xfrm>
             <a:off x="713428" y="1002632"/>
             <a:ext cx="7540235" cy="4363452"/>
+          </a:xfrm>
+          <a:prstGeom prst="rect">
+            <a:avLst/>
+          </a:prstGeom>
+        </p:spPr>
+      </p:pic>
+      <p:pic>
+        <p:nvPicPr>
+          <p:cNvPr id="4" name="Picture 3">
+            <a:extLst>
+              <a:ext uri="{FF2B5EF4-FFF2-40B4-BE49-F238E27FC236}">
+                <a16:creationId xmlns:a16="http://schemas.microsoft.com/office/drawing/2014/main" id="{951B71F1-67BC-49CC-8D45-DF90F4EA1D07}"/>
+              </a:ext>
+            </a:extLst>
+          </p:cNvPr>
+          <p:cNvPicPr>
+            <a:picLocks noChangeAspect="1"/>
+          </p:cNvPicPr>
+          <p:nvPr/>
+        </p:nvPicPr>
+        <p:blipFill>
+          <a:blip r:embed="rId3">
+            <a:extLst>
+              <a:ext uri="{28A0092B-C50C-407E-A947-70E740481C1C}">
+                <a14:useLocalDpi xmlns:a14="http://schemas.microsoft.com/office/drawing/2010/main" val="0"/>
+              </a:ext>
+            </a:extLst>
+          </a:blip>
+          <a:stretch>
+            <a:fillRect/>
+          </a:stretch>
+        </p:blipFill>
+        <p:spPr>
+          <a:xfrm>
+            <a:off x="699602" y="924952"/>
+            <a:ext cx="7667954" cy="4449153"/>
           </a:xfrm>
           <a:prstGeom prst="rect">
             <a:avLst/>
@@ -4034,31 +4464,6 @@
       </p:grpSpPr>
       <p:sp>
         <p:nvSpPr>
-          <p:cNvPr id="2" name="Title 1">
-            <a:extLst>
-              <a:ext uri="{FF2B5EF4-FFF2-40B4-BE49-F238E27FC236}">
-                <a16:creationId xmlns:a16="http://schemas.microsoft.com/office/drawing/2014/main" id="{77F35146-E997-488E-866C-893B12E2A8C6}"/>
-              </a:ext>
-            </a:extLst>
-          </p:cNvPr>
-          <p:cNvSpPr>
-            <a:spLocks noGrp="1"/>
-          </p:cNvSpPr>
-          <p:nvPr>
-            <p:ph type="title"/>
-          </p:nvPr>
-        </p:nvSpPr>
-        <p:spPr/>
-        <p:txBody>
-          <a:bodyPr/>
-          <a:lstStyle/>
-          <a:p>
-            <a:endParaRPr lang="en-IN" dirty="0"/>
-          </a:p>
-        </p:txBody>
-      </p:sp>
-      <p:sp>
-        <p:nvSpPr>
           <p:cNvPr id="3" name="Content Placeholder 2">
             <a:extLst>
               <a:ext uri="{FF2B5EF4-FFF2-40B4-BE49-F238E27FC236}">
@@ -4073,19 +4478,1184 @@
             <p:ph idx="1"/>
           </p:nvPr>
         </p:nvSpPr>
-        <p:spPr/>
-        <p:txBody>
-          <a:bodyPr/>
-          <a:lstStyle/>
-          <a:p>
-            <a:endParaRPr lang="en-IN" dirty="0"/>
-          </a:p>
-        </p:txBody>
-      </p:sp>
+        <p:spPr>
+          <a:xfrm>
+            <a:off x="838198" y="4676226"/>
+            <a:ext cx="10515601" cy="1252085"/>
+          </a:xfrm>
+        </p:spPr>
+        <p:txBody>
+          <a:bodyPr>
+            <a:normAutofit/>
+          </a:bodyPr>
+          <a:lstStyle/>
+          <a:p>
+            <a:pPr marL="0" indent="0">
+              <a:buNone/>
+            </a:pPr>
+            <a:r>
+              <a:rPr lang="en-US" dirty="0">
+                <a:solidFill>
+                  <a:schemeClr val="bg1">
+                    <a:lumMod val="50000"/>
+                  </a:schemeClr>
+                </a:solidFill>
+              </a:rPr>
+              <a:t>The system updates the ticket with the number of </a:t>
+            </a:r>
+            <a:r>
+              <a:rPr lang="en-US" b="1" dirty="0">
+                <a:solidFill>
+                  <a:schemeClr val="bg1">
+                    <a:lumMod val="50000"/>
+                  </a:schemeClr>
+                </a:solidFill>
+              </a:rPr>
+              <a:t>upvotes</a:t>
+            </a:r>
+            <a:r>
+              <a:rPr lang="en-US" dirty="0">
+                <a:solidFill>
+                  <a:schemeClr val="bg1">
+                    <a:lumMod val="50000"/>
+                  </a:schemeClr>
+                </a:solidFill>
+              </a:rPr>
+              <a:t> it has received and displays the most popular tickets at the top of the list on support and admin dashboards. </a:t>
+            </a:r>
+            <a:endParaRPr lang="en-IN" dirty="0">
+              <a:solidFill>
+                <a:schemeClr val="bg1">
+                  <a:lumMod val="50000"/>
+                </a:schemeClr>
+              </a:solidFill>
+            </a:endParaRPr>
+          </a:p>
+        </p:txBody>
+      </p:sp>
+      <p:pic>
+        <p:nvPicPr>
+          <p:cNvPr id="5" name="Picture 4">
+            <a:extLst>
+              <a:ext uri="{FF2B5EF4-FFF2-40B4-BE49-F238E27FC236}">
+                <a16:creationId xmlns:a16="http://schemas.microsoft.com/office/drawing/2014/main" id="{98DA88E0-0018-4ABE-9B3A-E5074E9FC6C2}"/>
+              </a:ext>
+            </a:extLst>
+          </p:cNvPr>
+          <p:cNvPicPr>
+            <a:picLocks noChangeAspect="1"/>
+          </p:cNvPicPr>
+          <p:nvPr/>
+        </p:nvPicPr>
+        <p:blipFill>
+          <a:blip r:embed="rId2">
+            <a:extLst>
+              <a:ext uri="{28A0092B-C50C-407E-A947-70E740481C1C}">
+                <a14:useLocalDpi xmlns:a14="http://schemas.microsoft.com/office/drawing/2010/main" val="0"/>
+              </a:ext>
+            </a:extLst>
+          </a:blip>
+          <a:stretch>
+            <a:fillRect/>
+          </a:stretch>
+        </p:blipFill>
+        <p:spPr>
+          <a:xfrm>
+            <a:off x="838198" y="1488071"/>
+            <a:ext cx="5199416" cy="3003717"/>
+          </a:xfrm>
+          <a:prstGeom prst="rect">
+            <a:avLst/>
+          </a:prstGeom>
+        </p:spPr>
+      </p:pic>
+      <p:pic>
+        <p:nvPicPr>
+          <p:cNvPr id="7" name="Picture 6">
+            <a:extLst>
+              <a:ext uri="{FF2B5EF4-FFF2-40B4-BE49-F238E27FC236}">
+                <a16:creationId xmlns:a16="http://schemas.microsoft.com/office/drawing/2014/main" id="{0A8F46FD-319D-4363-8088-18CC04654B0B}"/>
+              </a:ext>
+            </a:extLst>
+          </p:cNvPr>
+          <p:cNvPicPr>
+            <a:picLocks noChangeAspect="1"/>
+          </p:cNvPicPr>
+          <p:nvPr/>
+        </p:nvPicPr>
+        <p:blipFill>
+          <a:blip r:embed="rId3">
+            <a:extLst>
+              <a:ext uri="{28A0092B-C50C-407E-A947-70E740481C1C}">
+                <a14:useLocalDpi xmlns:a14="http://schemas.microsoft.com/office/drawing/2010/main" val="0"/>
+              </a:ext>
+            </a:extLst>
+          </a:blip>
+          <a:stretch>
+            <a:fillRect/>
+          </a:stretch>
+        </p:blipFill>
+        <p:spPr>
+          <a:xfrm>
+            <a:off x="6326457" y="1488071"/>
+            <a:ext cx="5202678" cy="3003717"/>
+          </a:xfrm>
+          <a:prstGeom prst="rect">
+            <a:avLst/>
+          </a:prstGeom>
+        </p:spPr>
+      </p:pic>
+      <p:sp>
+        <p:nvSpPr>
+          <p:cNvPr id="8" name="TextBox 7">
+            <a:extLst>
+              <a:ext uri="{FF2B5EF4-FFF2-40B4-BE49-F238E27FC236}">
+                <a16:creationId xmlns:a16="http://schemas.microsoft.com/office/drawing/2014/main" id="{E3C83DD3-E0D0-4C03-BD8E-E47931A531B4}"/>
+              </a:ext>
+            </a:extLst>
+          </p:cNvPr>
+          <p:cNvSpPr txBox="1"/>
+          <p:nvPr/>
+        </p:nvSpPr>
+        <p:spPr>
+          <a:xfrm>
+            <a:off x="826171" y="962711"/>
+            <a:ext cx="2663934" cy="461665"/>
+          </a:xfrm>
+          <a:prstGeom prst="rect">
+            <a:avLst/>
+          </a:prstGeom>
+          <a:noFill/>
+        </p:spPr>
+        <p:txBody>
+          <a:bodyPr wrap="none" rtlCol="0">
+            <a:spAutoFit/>
+          </a:bodyPr>
+          <a:lstStyle/>
+          <a:p>
+            <a:r>
+              <a:rPr lang="en-IN" sz="2400" b="1" dirty="0"/>
+              <a:t>Support Dashboard</a:t>
+            </a:r>
+          </a:p>
+        </p:txBody>
+      </p:sp>
+      <p:sp>
+        <p:nvSpPr>
+          <p:cNvPr id="9" name="TextBox 8">
+            <a:extLst>
+              <a:ext uri="{FF2B5EF4-FFF2-40B4-BE49-F238E27FC236}">
+                <a16:creationId xmlns:a16="http://schemas.microsoft.com/office/drawing/2014/main" id="{5A6908D1-0731-49EE-AAF7-78B021CC71CC}"/>
+              </a:ext>
+            </a:extLst>
+          </p:cNvPr>
+          <p:cNvSpPr txBox="1"/>
+          <p:nvPr/>
+        </p:nvSpPr>
+        <p:spPr>
+          <a:xfrm>
+            <a:off x="6328614" y="962711"/>
+            <a:ext cx="2482796" cy="461665"/>
+          </a:xfrm>
+          <a:prstGeom prst="rect">
+            <a:avLst/>
+          </a:prstGeom>
+          <a:noFill/>
+        </p:spPr>
+        <p:txBody>
+          <a:bodyPr wrap="none" rtlCol="0">
+            <a:spAutoFit/>
+          </a:bodyPr>
+          <a:lstStyle/>
+          <a:p>
+            <a:r>
+              <a:rPr lang="en-IN" sz="2400" b="1" dirty="0"/>
+              <a:t>Admin Dashboard</a:t>
+            </a:r>
+          </a:p>
+        </p:txBody>
+      </p:sp>
+      <p:pic>
+        <p:nvPicPr>
+          <p:cNvPr id="11" name="Picture 10">
+            <a:extLst>
+              <a:ext uri="{FF2B5EF4-FFF2-40B4-BE49-F238E27FC236}">
+                <a16:creationId xmlns:a16="http://schemas.microsoft.com/office/drawing/2014/main" id="{7C80409D-DEAF-43A7-9A20-F8E66109179D}"/>
+              </a:ext>
+            </a:extLst>
+          </p:cNvPr>
+          <p:cNvPicPr>
+            <a:picLocks noChangeAspect="1"/>
+          </p:cNvPicPr>
+          <p:nvPr/>
+        </p:nvPicPr>
+        <p:blipFill>
+          <a:blip r:embed="rId4">
+            <a:extLst>
+              <a:ext uri="{28A0092B-C50C-407E-A947-70E740481C1C}">
+                <a14:useLocalDpi xmlns:a14="http://schemas.microsoft.com/office/drawing/2010/main" val="0"/>
+              </a:ext>
+            </a:extLst>
+          </a:blip>
+          <a:stretch>
+            <a:fillRect/>
+          </a:stretch>
+        </p:blipFill>
+        <p:spPr>
+          <a:xfrm>
+            <a:off x="869276" y="1488071"/>
+            <a:ext cx="5209574" cy="3003718"/>
+          </a:xfrm>
+          <a:prstGeom prst="rect">
+            <a:avLst/>
+          </a:prstGeom>
+        </p:spPr>
+      </p:pic>
+      <p:pic>
+        <p:nvPicPr>
+          <p:cNvPr id="13" name="Picture 12">
+            <a:extLst>
+              <a:ext uri="{FF2B5EF4-FFF2-40B4-BE49-F238E27FC236}">
+                <a16:creationId xmlns:a16="http://schemas.microsoft.com/office/drawing/2014/main" id="{F8048B87-5C07-451A-8459-3EAA18D64C57}"/>
+              </a:ext>
+            </a:extLst>
+          </p:cNvPr>
+          <p:cNvPicPr>
+            <a:picLocks noChangeAspect="1"/>
+          </p:cNvPicPr>
+          <p:nvPr/>
+        </p:nvPicPr>
+        <p:blipFill>
+          <a:blip r:embed="rId5">
+            <a:extLst>
+              <a:ext uri="{28A0092B-C50C-407E-A947-70E740481C1C}">
+                <a14:useLocalDpi xmlns:a14="http://schemas.microsoft.com/office/drawing/2010/main" val="0"/>
+              </a:ext>
+            </a:extLst>
+          </a:blip>
+          <a:stretch>
+            <a:fillRect/>
+          </a:stretch>
+        </p:blipFill>
+        <p:spPr>
+          <a:xfrm>
+            <a:off x="6326456" y="1454448"/>
+            <a:ext cx="5250197" cy="3037340"/>
+          </a:xfrm>
+          <a:prstGeom prst="rect">
+            <a:avLst/>
+          </a:prstGeom>
+        </p:spPr>
+      </p:pic>
     </p:spTree>
     <p:extLst>
       <p:ext uri="{BB962C8B-B14F-4D97-AF65-F5344CB8AC3E}">
         <p14:creationId xmlns:p14="http://schemas.microsoft.com/office/powerpoint/2010/main" val="3595885513"/>
+      </p:ext>
+    </p:extLst>
+  </p:cSld>
+  <p:clrMapOvr>
+    <a:masterClrMapping/>
+  </p:clrMapOvr>
+</p:sld>
+</file>
+
+<file path=ppt/slides/slide7.xml><?xml version="1.0" encoding="utf-8"?>
+<p:sld xmlns:a="http://schemas.openxmlformats.org/drawingml/2006/main" xmlns:r="http://schemas.openxmlformats.org/officeDocument/2006/relationships" xmlns:p="http://schemas.openxmlformats.org/presentationml/2006/main">
+  <p:cSld>
+    <p:spTree>
+      <p:nvGrpSpPr>
+        <p:cNvPr id="1" name=""/>
+        <p:cNvGrpSpPr/>
+        <p:nvPr/>
+      </p:nvGrpSpPr>
+      <p:grpSpPr>
+        <a:xfrm>
+          <a:off x="0" y="0"/>
+          <a:ext cx="0" cy="0"/>
+          <a:chOff x="0" y="0"/>
+          <a:chExt cx="0" cy="0"/>
+        </a:xfrm>
+      </p:grpSpPr>
+      <p:sp>
+        <p:nvSpPr>
+          <p:cNvPr id="3" name="Content Placeholder 2">
+            <a:extLst>
+              <a:ext uri="{FF2B5EF4-FFF2-40B4-BE49-F238E27FC236}">
+                <a16:creationId xmlns:a16="http://schemas.microsoft.com/office/drawing/2014/main" id="{E92BED7C-AE9A-487C-89DC-CD26244CAFA1}"/>
+              </a:ext>
+            </a:extLst>
+          </p:cNvPr>
+          <p:cNvSpPr>
+            <a:spLocks noGrp="1"/>
+          </p:cNvSpPr>
+          <p:nvPr>
+            <p:ph idx="1"/>
+          </p:nvPr>
+        </p:nvSpPr>
+        <p:spPr>
+          <a:xfrm>
+            <a:off x="906379" y="5325977"/>
+            <a:ext cx="10447420" cy="1019425"/>
+          </a:xfrm>
+        </p:spPr>
+        <p:txBody>
+          <a:bodyPr>
+            <a:normAutofit fontScale="92500"/>
+          </a:bodyPr>
+          <a:lstStyle/>
+          <a:p>
+            <a:pPr marL="0" indent="0">
+              <a:buNone/>
+            </a:pPr>
+            <a:r>
+              <a:rPr lang="en-US" dirty="0">
+                <a:solidFill>
+                  <a:schemeClr val="bg1">
+                    <a:lumMod val="50000"/>
+                  </a:schemeClr>
+                </a:solidFill>
+              </a:rPr>
+              <a:t>If the student decides to add a comment to the existing ticket instead of creating a new one, she can do so by visiting the relevant Ticket page</a:t>
+            </a:r>
+            <a:endParaRPr lang="en-IN" dirty="0">
+              <a:solidFill>
+                <a:schemeClr val="bg1">
+                  <a:lumMod val="50000"/>
+                </a:schemeClr>
+              </a:solidFill>
+            </a:endParaRPr>
+          </a:p>
+        </p:txBody>
+      </p:sp>
+      <p:pic>
+        <p:nvPicPr>
+          <p:cNvPr id="7" name="Picture 6">
+            <a:extLst>
+              <a:ext uri="{FF2B5EF4-FFF2-40B4-BE49-F238E27FC236}">
+                <a16:creationId xmlns:a16="http://schemas.microsoft.com/office/drawing/2014/main" id="{CB42033F-578F-4DAC-A039-A616F9BDB74E}"/>
+              </a:ext>
+            </a:extLst>
+          </p:cNvPr>
+          <p:cNvPicPr>
+            <a:picLocks noChangeAspect="1"/>
+          </p:cNvPicPr>
+          <p:nvPr/>
+        </p:nvPicPr>
+        <p:blipFill rotWithShape="1">
+          <a:blip r:embed="rId2">
+            <a:extLst>
+              <a:ext uri="{28A0092B-C50C-407E-A947-70E740481C1C}">
+                <a14:useLocalDpi xmlns:a14="http://schemas.microsoft.com/office/drawing/2010/main" val="0"/>
+              </a:ext>
+            </a:extLst>
+          </a:blip>
+          <a:srcRect l="426" t="652"/>
+          <a:stretch/>
+        </p:blipFill>
+        <p:spPr>
+          <a:xfrm>
+            <a:off x="2112321" y="649703"/>
+            <a:ext cx="7967356" cy="4499495"/>
+          </a:xfrm>
+          <a:prstGeom prst="rect">
+            <a:avLst/>
+          </a:prstGeom>
+        </p:spPr>
+      </p:pic>
+    </p:spTree>
+    <p:extLst>
+      <p:ext uri="{BB962C8B-B14F-4D97-AF65-F5344CB8AC3E}">
+        <p14:creationId xmlns:p14="http://schemas.microsoft.com/office/powerpoint/2010/main" val="4193391974"/>
+      </p:ext>
+    </p:extLst>
+  </p:cSld>
+  <p:clrMapOvr>
+    <a:masterClrMapping/>
+  </p:clrMapOvr>
+</p:sld>
+</file>
+
+<file path=ppt/slides/slide8.xml><?xml version="1.0" encoding="utf-8"?>
+<p:sld xmlns:a="http://schemas.openxmlformats.org/drawingml/2006/main" xmlns:r="http://schemas.openxmlformats.org/officeDocument/2006/relationships" xmlns:p="http://schemas.openxmlformats.org/presentationml/2006/main">
+  <p:cSld>
+    <p:spTree>
+      <p:nvGrpSpPr>
+        <p:cNvPr id="1" name=""/>
+        <p:cNvGrpSpPr/>
+        <p:nvPr/>
+      </p:nvGrpSpPr>
+      <p:grpSpPr>
+        <a:xfrm>
+          <a:off x="0" y="0"/>
+          <a:ext cx="0" cy="0"/>
+          <a:chOff x="0" y="0"/>
+          <a:chExt cx="0" cy="0"/>
+        </a:xfrm>
+      </p:grpSpPr>
+      <p:sp>
+        <p:nvSpPr>
+          <p:cNvPr id="3" name="Content Placeholder 2">
+            <a:extLst>
+              <a:ext uri="{FF2B5EF4-FFF2-40B4-BE49-F238E27FC236}">
+                <a16:creationId xmlns:a16="http://schemas.microsoft.com/office/drawing/2014/main" id="{490402BF-020D-42D5-8054-96F7A47EBF11}"/>
+              </a:ext>
+            </a:extLst>
+          </p:cNvPr>
+          <p:cNvSpPr>
+            <a:spLocks noGrp="1"/>
+          </p:cNvSpPr>
+          <p:nvPr>
+            <p:ph idx="1"/>
+          </p:nvPr>
+        </p:nvSpPr>
+        <p:spPr>
+          <a:xfrm>
+            <a:off x="514802" y="4844339"/>
+            <a:ext cx="5428799" cy="778419"/>
+          </a:xfrm>
+        </p:spPr>
+        <p:txBody>
+          <a:bodyPr>
+            <a:normAutofit/>
+          </a:bodyPr>
+          <a:lstStyle/>
+          <a:p>
+            <a:pPr marL="0" indent="0">
+              <a:buNone/>
+            </a:pPr>
+            <a:r>
+              <a:rPr lang="en-US" sz="2000" dirty="0">
+                <a:solidFill>
+                  <a:schemeClr val="bg1">
+                    <a:lumMod val="50000"/>
+                  </a:schemeClr>
+                </a:solidFill>
+              </a:rPr>
+              <a:t>The support team receives the ticket and begins working on a solution. </a:t>
+            </a:r>
+            <a:endParaRPr lang="en-IN" sz="2000" dirty="0">
+              <a:solidFill>
+                <a:schemeClr val="bg1">
+                  <a:lumMod val="50000"/>
+                </a:schemeClr>
+              </a:solidFill>
+            </a:endParaRPr>
+          </a:p>
+        </p:txBody>
+      </p:sp>
+      <p:sp>
+        <p:nvSpPr>
+          <p:cNvPr id="4" name="Content Placeholder 2">
+            <a:extLst>
+              <a:ext uri="{FF2B5EF4-FFF2-40B4-BE49-F238E27FC236}">
+                <a16:creationId xmlns:a16="http://schemas.microsoft.com/office/drawing/2014/main" id="{84AFFBD4-7FB3-4112-A673-5ED9797DCE20}"/>
+              </a:ext>
+            </a:extLst>
+          </p:cNvPr>
+          <p:cNvSpPr txBox="1">
+            <a:spLocks/>
+          </p:cNvSpPr>
+          <p:nvPr/>
+        </p:nvSpPr>
+        <p:spPr>
+          <a:xfrm>
+            <a:off x="6216315" y="4844339"/>
+            <a:ext cx="5428798" cy="778419"/>
+          </a:xfrm>
+          <a:prstGeom prst="rect">
+            <a:avLst/>
+          </a:prstGeom>
+        </p:spPr>
+        <p:txBody>
+          <a:bodyPr vert="horz" lIns="91440" tIns="45720" rIns="91440" bIns="45720" rtlCol="0">
+            <a:normAutofit/>
+          </a:bodyPr>
+          <a:lstStyle>
+            <a:lvl1pPr marL="228600" indent="-228600" algn="l" defTabSz="914400" rtl="0" eaLnBrk="1" latinLnBrk="0" hangingPunct="1">
+              <a:lnSpc>
+                <a:spcPct val="90000"/>
+              </a:lnSpc>
+              <a:spcBef>
+                <a:spcPts val="1000"/>
+              </a:spcBef>
+              <a:buFont typeface="Arial" panose="020B0604020202020204" pitchFamily="34" charset="0"/>
+              <a:buChar char="•"/>
+              <a:defRPr sz="2800" kern="1200">
+                <a:solidFill>
+                  <a:schemeClr val="tx1"/>
+                </a:solidFill>
+                <a:latin typeface="+mn-lt"/>
+                <a:ea typeface="+mn-ea"/>
+                <a:cs typeface="+mn-cs"/>
+              </a:defRPr>
+            </a:lvl1pPr>
+            <a:lvl2pPr marL="685800" indent="-228600" algn="l" defTabSz="914400" rtl="0" eaLnBrk="1" latinLnBrk="0" hangingPunct="1">
+              <a:lnSpc>
+                <a:spcPct val="90000"/>
+              </a:lnSpc>
+              <a:spcBef>
+                <a:spcPts val="500"/>
+              </a:spcBef>
+              <a:buFont typeface="Arial" panose="020B0604020202020204" pitchFamily="34" charset="0"/>
+              <a:buChar char="•"/>
+              <a:defRPr sz="2400" kern="1200">
+                <a:solidFill>
+                  <a:schemeClr val="tx1"/>
+                </a:solidFill>
+                <a:latin typeface="+mn-lt"/>
+                <a:ea typeface="+mn-ea"/>
+                <a:cs typeface="+mn-cs"/>
+              </a:defRPr>
+            </a:lvl2pPr>
+            <a:lvl3pPr marL="1143000" indent="-228600" algn="l" defTabSz="914400" rtl="0" eaLnBrk="1" latinLnBrk="0" hangingPunct="1">
+              <a:lnSpc>
+                <a:spcPct val="90000"/>
+              </a:lnSpc>
+              <a:spcBef>
+                <a:spcPts val="500"/>
+              </a:spcBef>
+              <a:buFont typeface="Arial" panose="020B0604020202020204" pitchFamily="34" charset="0"/>
+              <a:buChar char="•"/>
+              <a:defRPr sz="2000" kern="1200">
+                <a:solidFill>
+                  <a:schemeClr val="tx1"/>
+                </a:solidFill>
+                <a:latin typeface="+mn-lt"/>
+                <a:ea typeface="+mn-ea"/>
+                <a:cs typeface="+mn-cs"/>
+              </a:defRPr>
+            </a:lvl3pPr>
+            <a:lvl4pPr marL="1600200" indent="-228600" algn="l" defTabSz="914400" rtl="0" eaLnBrk="1" latinLnBrk="0" hangingPunct="1">
+              <a:lnSpc>
+                <a:spcPct val="90000"/>
+              </a:lnSpc>
+              <a:spcBef>
+                <a:spcPts val="500"/>
+              </a:spcBef>
+              <a:buFont typeface="Arial" panose="020B0604020202020204" pitchFamily="34" charset="0"/>
+              <a:buChar char="•"/>
+              <a:defRPr sz="1800" kern="1200">
+                <a:solidFill>
+                  <a:schemeClr val="tx1"/>
+                </a:solidFill>
+                <a:latin typeface="+mn-lt"/>
+                <a:ea typeface="+mn-ea"/>
+                <a:cs typeface="+mn-cs"/>
+              </a:defRPr>
+            </a:lvl4pPr>
+            <a:lvl5pPr marL="2057400" indent="-228600" algn="l" defTabSz="914400" rtl="0" eaLnBrk="1" latinLnBrk="0" hangingPunct="1">
+              <a:lnSpc>
+                <a:spcPct val="90000"/>
+              </a:lnSpc>
+              <a:spcBef>
+                <a:spcPts val="500"/>
+              </a:spcBef>
+              <a:buFont typeface="Arial" panose="020B0604020202020204" pitchFamily="34" charset="0"/>
+              <a:buChar char="•"/>
+              <a:defRPr sz="1800" kern="1200">
+                <a:solidFill>
+                  <a:schemeClr val="tx1"/>
+                </a:solidFill>
+                <a:latin typeface="+mn-lt"/>
+                <a:ea typeface="+mn-ea"/>
+                <a:cs typeface="+mn-cs"/>
+              </a:defRPr>
+            </a:lvl5pPr>
+            <a:lvl6pPr marL="2514600" indent="-228600" algn="l" defTabSz="914400" rtl="0" eaLnBrk="1" latinLnBrk="0" hangingPunct="1">
+              <a:lnSpc>
+                <a:spcPct val="90000"/>
+              </a:lnSpc>
+              <a:spcBef>
+                <a:spcPts val="500"/>
+              </a:spcBef>
+              <a:buFont typeface="Arial" panose="020B0604020202020204" pitchFamily="34" charset="0"/>
+              <a:buChar char="•"/>
+              <a:defRPr sz="1800" kern="1200">
+                <a:solidFill>
+                  <a:schemeClr val="tx1"/>
+                </a:solidFill>
+                <a:latin typeface="+mn-lt"/>
+                <a:ea typeface="+mn-ea"/>
+                <a:cs typeface="+mn-cs"/>
+              </a:defRPr>
+            </a:lvl6pPr>
+            <a:lvl7pPr marL="2971800" indent="-228600" algn="l" defTabSz="914400" rtl="0" eaLnBrk="1" latinLnBrk="0" hangingPunct="1">
+              <a:lnSpc>
+                <a:spcPct val="90000"/>
+              </a:lnSpc>
+              <a:spcBef>
+                <a:spcPts val="500"/>
+              </a:spcBef>
+              <a:buFont typeface="Arial" panose="020B0604020202020204" pitchFamily="34" charset="0"/>
+              <a:buChar char="•"/>
+              <a:defRPr sz="1800" kern="1200">
+                <a:solidFill>
+                  <a:schemeClr val="tx1"/>
+                </a:solidFill>
+                <a:latin typeface="+mn-lt"/>
+                <a:ea typeface="+mn-ea"/>
+                <a:cs typeface="+mn-cs"/>
+              </a:defRPr>
+            </a:lvl7pPr>
+            <a:lvl8pPr marL="3429000" indent="-228600" algn="l" defTabSz="914400" rtl="0" eaLnBrk="1" latinLnBrk="0" hangingPunct="1">
+              <a:lnSpc>
+                <a:spcPct val="90000"/>
+              </a:lnSpc>
+              <a:spcBef>
+                <a:spcPts val="500"/>
+              </a:spcBef>
+              <a:buFont typeface="Arial" panose="020B0604020202020204" pitchFamily="34" charset="0"/>
+              <a:buChar char="•"/>
+              <a:defRPr sz="1800" kern="1200">
+                <a:solidFill>
+                  <a:schemeClr val="tx1"/>
+                </a:solidFill>
+                <a:latin typeface="+mn-lt"/>
+                <a:ea typeface="+mn-ea"/>
+                <a:cs typeface="+mn-cs"/>
+              </a:defRPr>
+            </a:lvl8pPr>
+            <a:lvl9pPr marL="3886200" indent="-228600" algn="l" defTabSz="914400" rtl="0" eaLnBrk="1" latinLnBrk="0" hangingPunct="1">
+              <a:lnSpc>
+                <a:spcPct val="90000"/>
+              </a:lnSpc>
+              <a:spcBef>
+                <a:spcPts val="500"/>
+              </a:spcBef>
+              <a:buFont typeface="Arial" panose="020B0604020202020204" pitchFamily="34" charset="0"/>
+              <a:buChar char="•"/>
+              <a:defRPr sz="1800" kern="1200">
+                <a:solidFill>
+                  <a:schemeClr val="tx1"/>
+                </a:solidFill>
+                <a:latin typeface="+mn-lt"/>
+                <a:ea typeface="+mn-ea"/>
+                <a:cs typeface="+mn-cs"/>
+              </a:defRPr>
+            </a:lvl9pPr>
+          </a:lstStyle>
+          <a:p>
+            <a:pPr marL="0" indent="0">
+              <a:buFont typeface="Arial" panose="020B0604020202020204" pitchFamily="34" charset="0"/>
+              <a:buNone/>
+            </a:pPr>
+            <a:r>
+              <a:rPr lang="en-US" sz="2000" dirty="0">
+                <a:solidFill>
+                  <a:schemeClr val="bg1">
+                    <a:lumMod val="50000"/>
+                  </a:schemeClr>
+                </a:solidFill>
+              </a:rPr>
+              <a:t>They can view the ticket, add comments, and update the ticket status as they work on the issue.</a:t>
+            </a:r>
+            <a:endParaRPr lang="en-IN" sz="2000" dirty="0">
+              <a:solidFill>
+                <a:schemeClr val="bg1">
+                  <a:lumMod val="50000"/>
+                </a:schemeClr>
+              </a:solidFill>
+            </a:endParaRPr>
+          </a:p>
+        </p:txBody>
+      </p:sp>
+      <p:pic>
+        <p:nvPicPr>
+          <p:cNvPr id="6" name="Picture 5">
+            <a:extLst>
+              <a:ext uri="{FF2B5EF4-FFF2-40B4-BE49-F238E27FC236}">
+                <a16:creationId xmlns:a16="http://schemas.microsoft.com/office/drawing/2014/main" id="{F478D695-DC2C-4367-9013-71EAC1748598}"/>
+              </a:ext>
+            </a:extLst>
+          </p:cNvPr>
+          <p:cNvPicPr>
+            <a:picLocks noChangeAspect="1"/>
+          </p:cNvPicPr>
+          <p:nvPr/>
+        </p:nvPicPr>
+        <p:blipFill>
+          <a:blip r:embed="rId2">
+            <a:extLst>
+              <a:ext uri="{28A0092B-C50C-407E-A947-70E740481C1C}">
+                <a14:useLocalDpi xmlns:a14="http://schemas.microsoft.com/office/drawing/2010/main" val="0"/>
+              </a:ext>
+            </a:extLst>
+          </a:blip>
+          <a:stretch>
+            <a:fillRect/>
+          </a:stretch>
+        </p:blipFill>
+        <p:spPr>
+          <a:xfrm>
+            <a:off x="514802" y="1548063"/>
+            <a:ext cx="5428799" cy="3136232"/>
+          </a:xfrm>
+          <a:prstGeom prst="rect">
+            <a:avLst/>
+          </a:prstGeom>
+        </p:spPr>
+      </p:pic>
+      <p:pic>
+        <p:nvPicPr>
+          <p:cNvPr id="8" name="Picture 7">
+            <a:extLst>
+              <a:ext uri="{FF2B5EF4-FFF2-40B4-BE49-F238E27FC236}">
+                <a16:creationId xmlns:a16="http://schemas.microsoft.com/office/drawing/2014/main" id="{FCEDC092-2E2E-4C28-8670-6CBA7675A3B5}"/>
+              </a:ext>
+            </a:extLst>
+          </p:cNvPr>
+          <p:cNvPicPr>
+            <a:picLocks noChangeAspect="1"/>
+          </p:cNvPicPr>
+          <p:nvPr/>
+        </p:nvPicPr>
+        <p:blipFill>
+          <a:blip r:embed="rId3">
+            <a:extLst>
+              <a:ext uri="{28A0092B-C50C-407E-A947-70E740481C1C}">
+                <a14:useLocalDpi xmlns:a14="http://schemas.microsoft.com/office/drawing/2010/main" val="0"/>
+              </a:ext>
+            </a:extLst>
+          </a:blip>
+          <a:stretch>
+            <a:fillRect/>
+          </a:stretch>
+        </p:blipFill>
+        <p:spPr>
+          <a:xfrm>
+            <a:off x="6216315" y="1565389"/>
+            <a:ext cx="5428799" cy="3118906"/>
+          </a:xfrm>
+          <a:prstGeom prst="rect">
+            <a:avLst/>
+          </a:prstGeom>
+        </p:spPr>
+      </p:pic>
+      <p:sp>
+        <p:nvSpPr>
+          <p:cNvPr id="9" name="TextBox 8">
+            <a:extLst>
+              <a:ext uri="{FF2B5EF4-FFF2-40B4-BE49-F238E27FC236}">
+                <a16:creationId xmlns:a16="http://schemas.microsoft.com/office/drawing/2014/main" id="{76C3EF2F-663F-4069-9CFE-7E7B29F45AF7}"/>
+              </a:ext>
+            </a:extLst>
+          </p:cNvPr>
+          <p:cNvSpPr txBox="1"/>
+          <p:nvPr/>
+        </p:nvSpPr>
+        <p:spPr>
+          <a:xfrm>
+            <a:off x="514802" y="1006376"/>
+            <a:ext cx="2663934" cy="461665"/>
+          </a:xfrm>
+          <a:prstGeom prst="rect">
+            <a:avLst/>
+          </a:prstGeom>
+          <a:noFill/>
+        </p:spPr>
+        <p:txBody>
+          <a:bodyPr wrap="none" rtlCol="0">
+            <a:spAutoFit/>
+          </a:bodyPr>
+          <a:lstStyle/>
+          <a:p>
+            <a:r>
+              <a:rPr lang="en-IN" sz="2400" b="1" dirty="0"/>
+              <a:t>Support Dashboard</a:t>
+            </a:r>
+          </a:p>
+        </p:txBody>
+      </p:sp>
+      <p:sp>
+        <p:nvSpPr>
+          <p:cNvPr id="10" name="TextBox 9">
+            <a:extLst>
+              <a:ext uri="{FF2B5EF4-FFF2-40B4-BE49-F238E27FC236}">
+                <a16:creationId xmlns:a16="http://schemas.microsoft.com/office/drawing/2014/main" id="{27B94FA5-8AD0-44A5-BDC6-64EE6550BB28}"/>
+              </a:ext>
+            </a:extLst>
+          </p:cNvPr>
+          <p:cNvSpPr txBox="1"/>
+          <p:nvPr/>
+        </p:nvSpPr>
+        <p:spPr>
+          <a:xfrm>
+            <a:off x="6216315" y="1006376"/>
+            <a:ext cx="1617109" cy="461665"/>
+          </a:xfrm>
+          <a:prstGeom prst="rect">
+            <a:avLst/>
+          </a:prstGeom>
+          <a:noFill/>
+        </p:spPr>
+        <p:txBody>
+          <a:bodyPr wrap="none" rtlCol="0">
+            <a:spAutoFit/>
+          </a:bodyPr>
+          <a:lstStyle/>
+          <a:p>
+            <a:r>
+              <a:rPr lang="en-IN" sz="2400" b="1" dirty="0"/>
+              <a:t>Ticket Page</a:t>
+            </a:r>
+          </a:p>
+        </p:txBody>
+      </p:sp>
+      <p:pic>
+        <p:nvPicPr>
+          <p:cNvPr id="12" name="Picture 11">
+            <a:extLst>
+              <a:ext uri="{FF2B5EF4-FFF2-40B4-BE49-F238E27FC236}">
+                <a16:creationId xmlns:a16="http://schemas.microsoft.com/office/drawing/2014/main" id="{BA122AA2-0E5F-4A2E-B8EC-DB5957903FA2}"/>
+              </a:ext>
+            </a:extLst>
+          </p:cNvPr>
+          <p:cNvPicPr>
+            <a:picLocks noChangeAspect="1"/>
+          </p:cNvPicPr>
+          <p:nvPr/>
+        </p:nvPicPr>
+        <p:blipFill rotWithShape="1">
+          <a:blip r:embed="rId4">
+            <a:extLst>
+              <a:ext uri="{28A0092B-C50C-407E-A947-70E740481C1C}">
+                <a14:useLocalDpi xmlns:a14="http://schemas.microsoft.com/office/drawing/2010/main" val="0"/>
+              </a:ext>
+            </a:extLst>
+          </a:blip>
+          <a:srcRect l="281"/>
+          <a:stretch/>
+        </p:blipFill>
+        <p:spPr>
+          <a:xfrm>
+            <a:off x="6180474" y="1565389"/>
+            <a:ext cx="5480634" cy="3110885"/>
+          </a:xfrm>
+          <a:prstGeom prst="rect">
+            <a:avLst/>
+          </a:prstGeom>
+        </p:spPr>
+      </p:pic>
+      <p:pic>
+        <p:nvPicPr>
+          <p:cNvPr id="14" name="Picture 13">
+            <a:extLst>
+              <a:ext uri="{FF2B5EF4-FFF2-40B4-BE49-F238E27FC236}">
+                <a16:creationId xmlns:a16="http://schemas.microsoft.com/office/drawing/2014/main" id="{36B8CF2B-6116-4F0B-B8FA-D2AE314EE43C}"/>
+              </a:ext>
+            </a:extLst>
+          </p:cNvPr>
+          <p:cNvPicPr>
+            <a:picLocks noChangeAspect="1"/>
+          </p:cNvPicPr>
+          <p:nvPr/>
+        </p:nvPicPr>
+        <p:blipFill>
+          <a:blip r:embed="rId5">
+            <a:extLst>
+              <a:ext uri="{28A0092B-C50C-407E-A947-70E740481C1C}">
+                <a14:useLocalDpi xmlns:a14="http://schemas.microsoft.com/office/drawing/2010/main" val="0"/>
+              </a:ext>
+            </a:extLst>
+          </a:blip>
+          <a:stretch>
+            <a:fillRect/>
+          </a:stretch>
+        </p:blipFill>
+        <p:spPr>
+          <a:xfrm>
+            <a:off x="530892" y="1575292"/>
+            <a:ext cx="5439403" cy="3136232"/>
+          </a:xfrm>
+          <a:prstGeom prst="rect">
+            <a:avLst/>
+          </a:prstGeom>
+        </p:spPr>
+      </p:pic>
+    </p:spTree>
+    <p:extLst>
+      <p:ext uri="{BB962C8B-B14F-4D97-AF65-F5344CB8AC3E}">
+        <p14:creationId xmlns:p14="http://schemas.microsoft.com/office/powerpoint/2010/main" val="2516392579"/>
+      </p:ext>
+    </p:extLst>
+  </p:cSld>
+  <p:clrMapOvr>
+    <a:masterClrMapping/>
+  </p:clrMapOvr>
+</p:sld>
+</file>
+
+<file path=ppt/slides/slide9.xml><?xml version="1.0" encoding="utf-8"?>
+<p:sld xmlns:a="http://schemas.openxmlformats.org/drawingml/2006/main" xmlns:r="http://schemas.openxmlformats.org/officeDocument/2006/relationships" xmlns:p="http://schemas.openxmlformats.org/presentationml/2006/main">
+  <p:cSld>
+    <p:spTree>
+      <p:nvGrpSpPr>
+        <p:cNvPr id="1" name=""/>
+        <p:cNvGrpSpPr/>
+        <p:nvPr/>
+      </p:nvGrpSpPr>
+      <p:grpSpPr>
+        <a:xfrm>
+          <a:off x="0" y="0"/>
+          <a:ext cx="0" cy="0"/>
+          <a:chOff x="0" y="0"/>
+          <a:chExt cx="0" cy="0"/>
+        </a:xfrm>
+      </p:grpSpPr>
+      <p:sp>
+        <p:nvSpPr>
+          <p:cNvPr id="3" name="Content Placeholder 2">
+            <a:extLst>
+              <a:ext uri="{FF2B5EF4-FFF2-40B4-BE49-F238E27FC236}">
+                <a16:creationId xmlns:a16="http://schemas.microsoft.com/office/drawing/2014/main" id="{54E999D1-9C0D-4627-9242-9E30AC7C661F}"/>
+              </a:ext>
+            </a:extLst>
+          </p:cNvPr>
+          <p:cNvSpPr>
+            <a:spLocks noGrp="1"/>
+          </p:cNvSpPr>
+          <p:nvPr>
+            <p:ph idx="1"/>
+          </p:nvPr>
+        </p:nvSpPr>
+        <p:spPr>
+          <a:xfrm>
+            <a:off x="8290791" y="1312742"/>
+            <a:ext cx="3063009" cy="5409652"/>
+          </a:xfrm>
+        </p:spPr>
+        <p:txBody>
+          <a:bodyPr>
+            <a:normAutofit/>
+          </a:bodyPr>
+          <a:lstStyle/>
+          <a:p>
+            <a:r>
+              <a:rPr lang="en-US" sz="2000" dirty="0">
+                <a:solidFill>
+                  <a:schemeClr val="bg1">
+                    <a:lumMod val="50000"/>
+                  </a:schemeClr>
+                </a:solidFill>
+              </a:rPr>
+              <a:t>Once the support team resolves the issue, they update the ticket status to </a:t>
+            </a:r>
+            <a:r>
+              <a:rPr lang="en-US" sz="2000" b="1" dirty="0">
+                <a:solidFill>
+                  <a:schemeClr val="bg1">
+                    <a:lumMod val="50000"/>
+                  </a:schemeClr>
+                </a:solidFill>
+              </a:rPr>
+              <a:t>Resolved</a:t>
+            </a:r>
+            <a:r>
+              <a:rPr lang="en-US" sz="2000" dirty="0">
+                <a:solidFill>
+                  <a:schemeClr val="bg1">
+                    <a:lumMod val="50000"/>
+                  </a:schemeClr>
+                </a:solidFill>
+              </a:rPr>
+              <a:t> and notify the student.</a:t>
+            </a:r>
+          </a:p>
+          <a:p>
+            <a:r>
+              <a:rPr lang="en-US" sz="2000" dirty="0">
+                <a:solidFill>
+                  <a:schemeClr val="bg1">
+                    <a:lumMod val="50000"/>
+                  </a:schemeClr>
+                </a:solidFill>
+              </a:rPr>
+              <a:t>The student receives a notification about the updated status of the ticket and can view the solution provided by the support team.</a:t>
+            </a:r>
+          </a:p>
+          <a:p>
+            <a:r>
+              <a:rPr lang="en-US" sz="2000" dirty="0">
+                <a:solidFill>
+                  <a:schemeClr val="bg1">
+                    <a:lumMod val="50000"/>
+                  </a:schemeClr>
+                </a:solidFill>
+              </a:rPr>
+              <a:t>The status of ticket changes from </a:t>
+            </a:r>
+            <a:r>
+              <a:rPr lang="en-US" sz="2000" b="1" dirty="0">
+                <a:solidFill>
+                  <a:schemeClr val="bg1">
+                    <a:lumMod val="50000"/>
+                  </a:schemeClr>
+                </a:solidFill>
+              </a:rPr>
+              <a:t>Open</a:t>
+            </a:r>
+            <a:r>
+              <a:rPr lang="en-US" sz="2000" dirty="0">
+                <a:solidFill>
+                  <a:schemeClr val="bg1">
+                    <a:lumMod val="50000"/>
+                  </a:schemeClr>
+                </a:solidFill>
+              </a:rPr>
+              <a:t> to </a:t>
+            </a:r>
+            <a:r>
+              <a:rPr lang="en-US" sz="2000" b="1" dirty="0">
+                <a:solidFill>
+                  <a:schemeClr val="bg1">
+                    <a:lumMod val="50000"/>
+                  </a:schemeClr>
+                </a:solidFill>
+              </a:rPr>
+              <a:t>Resolved</a:t>
+            </a:r>
+            <a:r>
+              <a:rPr lang="en-US" sz="2000" dirty="0">
+                <a:solidFill>
+                  <a:schemeClr val="bg1">
+                    <a:lumMod val="50000"/>
+                  </a:schemeClr>
+                </a:solidFill>
+              </a:rPr>
+              <a:t> on the </a:t>
+            </a:r>
+            <a:r>
+              <a:rPr lang="en-US" sz="2000" i="1" dirty="0">
+                <a:solidFill>
+                  <a:schemeClr val="bg1">
+                    <a:lumMod val="50000"/>
+                  </a:schemeClr>
+                </a:solidFill>
+              </a:rPr>
+              <a:t>Student Dashboard</a:t>
+            </a:r>
+            <a:endParaRPr lang="en-IN" sz="2000" i="1" dirty="0">
+              <a:solidFill>
+                <a:schemeClr val="bg1">
+                  <a:lumMod val="50000"/>
+                </a:schemeClr>
+              </a:solidFill>
+            </a:endParaRPr>
+          </a:p>
+        </p:txBody>
+      </p:sp>
+      <p:pic>
+        <p:nvPicPr>
+          <p:cNvPr id="5" name="Picture 4">
+            <a:extLst>
+              <a:ext uri="{FF2B5EF4-FFF2-40B4-BE49-F238E27FC236}">
+                <a16:creationId xmlns:a16="http://schemas.microsoft.com/office/drawing/2014/main" id="{21C726AB-650A-411E-ABBF-EE4E3DC708C0}"/>
+              </a:ext>
+            </a:extLst>
+          </p:cNvPr>
+          <p:cNvPicPr>
+            <a:picLocks noChangeAspect="1"/>
+          </p:cNvPicPr>
+          <p:nvPr/>
+        </p:nvPicPr>
+        <p:blipFill>
+          <a:blip r:embed="rId2">
+            <a:extLst>
+              <a:ext uri="{28A0092B-C50C-407E-A947-70E740481C1C}">
+                <a14:useLocalDpi xmlns:a14="http://schemas.microsoft.com/office/drawing/2010/main" val="0"/>
+              </a:ext>
+            </a:extLst>
+          </a:blip>
+          <a:stretch>
+            <a:fillRect/>
+          </a:stretch>
+        </p:blipFill>
+        <p:spPr>
+          <a:xfrm>
+            <a:off x="704963" y="1392952"/>
+            <a:ext cx="7585828" cy="4358143"/>
+          </a:xfrm>
+          <a:prstGeom prst="rect">
+            <a:avLst/>
+          </a:prstGeom>
+        </p:spPr>
+      </p:pic>
+      <p:sp>
+        <p:nvSpPr>
+          <p:cNvPr id="6" name="TextBox 5">
+            <a:extLst>
+              <a:ext uri="{FF2B5EF4-FFF2-40B4-BE49-F238E27FC236}">
+                <a16:creationId xmlns:a16="http://schemas.microsoft.com/office/drawing/2014/main" id="{673C403C-1145-4294-A9CE-9D4464427895}"/>
+              </a:ext>
+            </a:extLst>
+          </p:cNvPr>
+          <p:cNvSpPr txBox="1"/>
+          <p:nvPr/>
+        </p:nvSpPr>
+        <p:spPr>
+          <a:xfrm>
+            <a:off x="704963" y="843055"/>
+            <a:ext cx="2625764" cy="469687"/>
+          </a:xfrm>
+          <a:prstGeom prst="rect">
+            <a:avLst/>
+          </a:prstGeom>
+          <a:noFill/>
+        </p:spPr>
+        <p:txBody>
+          <a:bodyPr wrap="square" rtlCol="0">
+            <a:spAutoFit/>
+          </a:bodyPr>
+          <a:lstStyle/>
+          <a:p>
+            <a:r>
+              <a:rPr lang="en-IN" sz="2400" b="1" dirty="0"/>
+              <a:t>Student Dashboard</a:t>
+            </a:r>
+          </a:p>
+        </p:txBody>
+      </p:sp>
+      <p:pic>
+        <p:nvPicPr>
+          <p:cNvPr id="8" name="Picture 7">
+            <a:extLst>
+              <a:ext uri="{FF2B5EF4-FFF2-40B4-BE49-F238E27FC236}">
+                <a16:creationId xmlns:a16="http://schemas.microsoft.com/office/drawing/2014/main" id="{8D7F016A-76AA-41DF-A389-113C7326D82B}"/>
+              </a:ext>
+            </a:extLst>
+          </p:cNvPr>
+          <p:cNvPicPr>
+            <a:picLocks noChangeAspect="1"/>
+          </p:cNvPicPr>
+          <p:nvPr/>
+        </p:nvPicPr>
+        <p:blipFill>
+          <a:blip r:embed="rId3">
+            <a:extLst>
+              <a:ext uri="{28A0092B-C50C-407E-A947-70E740481C1C}">
+                <a14:useLocalDpi xmlns:a14="http://schemas.microsoft.com/office/drawing/2010/main" val="0"/>
+              </a:ext>
+            </a:extLst>
+          </a:blip>
+          <a:stretch>
+            <a:fillRect/>
+          </a:stretch>
+        </p:blipFill>
+        <p:spPr>
+          <a:xfrm>
+            <a:off x="704964" y="1333182"/>
+            <a:ext cx="7585828" cy="4401501"/>
+          </a:xfrm>
+          <a:prstGeom prst="rect">
+            <a:avLst/>
+          </a:prstGeom>
+        </p:spPr>
+      </p:pic>
+    </p:spTree>
+    <p:extLst>
+      <p:ext uri="{BB962C8B-B14F-4D97-AF65-F5344CB8AC3E}">
+        <p14:creationId xmlns:p14="http://schemas.microsoft.com/office/powerpoint/2010/main" val="1414332143"/>
       </p:ext>
     </p:extLst>
   </p:cSld>

</xml_diff>